<commit_message>
[clinet] fix minor things for functionality
fix minor things for functionality
</commit_message>
<xml_diff>
--- a/docs/10_implementation/architecture.pptx
+++ b/docs/10_implementation/architecture.pptx
@@ -245,7 +245,7 @@
           <a:p>
             <a:fld id="{CE992262-0062-4EDD-B0C3-8606D6178BEB}" type="datetimeFigureOut">
               <a:rPr lang="ko-KR" altLang="en-US" smtClean="0"/>
-              <a:t>2021-06-13</a:t>
+              <a:t>2021-06-14</a:t>
             </a:fld>
             <a:endParaRPr lang="ko-KR" altLang="en-US"/>
           </a:p>
@@ -415,7 +415,7 @@
           <a:p>
             <a:fld id="{CE992262-0062-4EDD-B0C3-8606D6178BEB}" type="datetimeFigureOut">
               <a:rPr lang="ko-KR" altLang="en-US" smtClean="0"/>
-              <a:t>2021-06-13</a:t>
+              <a:t>2021-06-14</a:t>
             </a:fld>
             <a:endParaRPr lang="ko-KR" altLang="en-US"/>
           </a:p>
@@ -595,7 +595,7 @@
           <a:p>
             <a:fld id="{CE992262-0062-4EDD-B0C3-8606D6178BEB}" type="datetimeFigureOut">
               <a:rPr lang="ko-KR" altLang="en-US" smtClean="0"/>
-              <a:t>2021-06-13</a:t>
+              <a:t>2021-06-14</a:t>
             </a:fld>
             <a:endParaRPr lang="ko-KR" altLang="en-US"/>
           </a:p>
@@ -765,7 +765,7 @@
           <a:p>
             <a:fld id="{CE992262-0062-4EDD-B0C3-8606D6178BEB}" type="datetimeFigureOut">
               <a:rPr lang="ko-KR" altLang="en-US" smtClean="0"/>
-              <a:t>2021-06-13</a:t>
+              <a:t>2021-06-14</a:t>
             </a:fld>
             <a:endParaRPr lang="ko-KR" altLang="en-US"/>
           </a:p>
@@ -1011,7 +1011,7 @@
           <a:p>
             <a:fld id="{CE992262-0062-4EDD-B0C3-8606D6178BEB}" type="datetimeFigureOut">
               <a:rPr lang="ko-KR" altLang="en-US" smtClean="0"/>
-              <a:t>2021-06-13</a:t>
+              <a:t>2021-06-14</a:t>
             </a:fld>
             <a:endParaRPr lang="ko-KR" altLang="en-US"/>
           </a:p>
@@ -1243,7 +1243,7 @@
           <a:p>
             <a:fld id="{CE992262-0062-4EDD-B0C3-8606D6178BEB}" type="datetimeFigureOut">
               <a:rPr lang="ko-KR" altLang="en-US" smtClean="0"/>
-              <a:t>2021-06-13</a:t>
+              <a:t>2021-06-14</a:t>
             </a:fld>
             <a:endParaRPr lang="ko-KR" altLang="en-US"/>
           </a:p>
@@ -1610,7 +1610,7 @@
           <a:p>
             <a:fld id="{CE992262-0062-4EDD-B0C3-8606D6178BEB}" type="datetimeFigureOut">
               <a:rPr lang="ko-KR" altLang="en-US" smtClean="0"/>
-              <a:t>2021-06-13</a:t>
+              <a:t>2021-06-14</a:t>
             </a:fld>
             <a:endParaRPr lang="ko-KR" altLang="en-US"/>
           </a:p>
@@ -1728,7 +1728,7 @@
           <a:p>
             <a:fld id="{CE992262-0062-4EDD-B0C3-8606D6178BEB}" type="datetimeFigureOut">
               <a:rPr lang="ko-KR" altLang="en-US" smtClean="0"/>
-              <a:t>2021-06-13</a:t>
+              <a:t>2021-06-14</a:t>
             </a:fld>
             <a:endParaRPr lang="ko-KR" altLang="en-US"/>
           </a:p>
@@ -1823,7 +1823,7 @@
           <a:p>
             <a:fld id="{CE992262-0062-4EDD-B0C3-8606D6178BEB}" type="datetimeFigureOut">
               <a:rPr lang="ko-KR" altLang="en-US" smtClean="0"/>
-              <a:t>2021-06-13</a:t>
+              <a:t>2021-06-14</a:t>
             </a:fld>
             <a:endParaRPr lang="ko-KR" altLang="en-US"/>
           </a:p>
@@ -2100,7 +2100,7 @@
           <a:p>
             <a:fld id="{CE992262-0062-4EDD-B0C3-8606D6178BEB}" type="datetimeFigureOut">
               <a:rPr lang="ko-KR" altLang="en-US" smtClean="0"/>
-              <a:t>2021-06-13</a:t>
+              <a:t>2021-06-14</a:t>
             </a:fld>
             <a:endParaRPr lang="ko-KR" altLang="en-US"/>
           </a:p>
@@ -2353,7 +2353,7 @@
           <a:p>
             <a:fld id="{CE992262-0062-4EDD-B0C3-8606D6178BEB}" type="datetimeFigureOut">
               <a:rPr lang="ko-KR" altLang="en-US" smtClean="0"/>
-              <a:t>2021-06-13</a:t>
+              <a:t>2021-06-14</a:t>
             </a:fld>
             <a:endParaRPr lang="ko-KR" altLang="en-US"/>
           </a:p>
@@ -2566,7 +2566,7 @@
           <a:p>
             <a:fld id="{CE992262-0062-4EDD-B0C3-8606D6178BEB}" type="datetimeFigureOut">
               <a:rPr lang="ko-KR" altLang="en-US" smtClean="0"/>
-              <a:t>2021-06-13</a:t>
+              <a:t>2021-06-14</a:t>
             </a:fld>
             <a:endParaRPr lang="ko-KR" altLang="en-US"/>
           </a:p>
@@ -5718,11 +5718,7 @@
             </a:pPr>
             <a:r>
               <a:rPr lang="en-US" altLang="ko-KR" sz="1100" dirty="0" smtClean="0"/>
-              <a:t>logout: </a:t>
-            </a:r>
-            <a:r>
-              <a:rPr lang="en-US" altLang="ko-KR" sz="1100" dirty="0" smtClean="0"/>
-              <a:t>sever and client are disconnected. </a:t>
+              <a:t>logout: sever and client are disconnected. </a:t>
             </a:r>
           </a:p>
           <a:p>
@@ -5775,15 +5771,7 @@
             </a:pPr>
             <a:r>
               <a:rPr lang="en-US" altLang="ko-KR" sz="1100" dirty="0" smtClean="0"/>
-              <a:t>secure test run: can </a:t>
-            </a:r>
-            <a:r>
-              <a:rPr lang="en-US" altLang="ko-KR" sz="1100" dirty="0" smtClean="0"/>
-              <a:t>securely </a:t>
-            </a:r>
-            <a:r>
-              <a:rPr lang="en-US" altLang="ko-KR" sz="1100" dirty="0" smtClean="0"/>
-              <a:t>receive the image data</a:t>
+              <a:t>secure test run: can securely receive the image data</a:t>
             </a:r>
           </a:p>
           <a:p>
@@ -5825,11 +5813,7 @@
             </a:pPr>
             <a:r>
               <a:rPr lang="en-US" altLang="ko-KR" sz="1100" dirty="0" smtClean="0"/>
-              <a:t>non </a:t>
-            </a:r>
-            <a:r>
-              <a:rPr lang="en-US" altLang="ko-KR" sz="1100" dirty="0" smtClean="0"/>
-              <a:t>secure test run: can receive the image data</a:t>
+              <a:t>non secure test run: can receive the image data</a:t>
             </a:r>
           </a:p>
           <a:p>

</xml_diff>

<commit_message>
[docs] capture some client image
capture some client image
</commit_message>
<xml_diff>
--- a/docs/10_implementation/architecture.pptx
+++ b/docs/10_implementation/architecture.pptx
@@ -8,6 +8,8 @@
     <p:sldId id="256" r:id="rId2"/>
     <p:sldId id="259" r:id="rId3"/>
     <p:sldId id="257" r:id="rId4"/>
+    <p:sldId id="260" r:id="rId5"/>
+    <p:sldId id="261" r:id="rId6"/>
   </p:sldIdLst>
   <p:sldSz cx="12192000" cy="6858000"/>
   <p:notesSz cx="6858000" cy="9144000"/>
@@ -245,7 +247,7 @@
           <a:p>
             <a:fld id="{CE992262-0062-4EDD-B0C3-8606D6178BEB}" type="datetimeFigureOut">
               <a:rPr lang="ko-KR" altLang="en-US" smtClean="0"/>
-              <a:t>2021-06-15</a:t>
+              <a:t>2021-06-17</a:t>
             </a:fld>
             <a:endParaRPr lang="ko-KR" altLang="en-US"/>
           </a:p>
@@ -415,7 +417,7 @@
           <a:p>
             <a:fld id="{CE992262-0062-4EDD-B0C3-8606D6178BEB}" type="datetimeFigureOut">
               <a:rPr lang="ko-KR" altLang="en-US" smtClean="0"/>
-              <a:t>2021-06-15</a:t>
+              <a:t>2021-06-17</a:t>
             </a:fld>
             <a:endParaRPr lang="ko-KR" altLang="en-US"/>
           </a:p>
@@ -595,7 +597,7 @@
           <a:p>
             <a:fld id="{CE992262-0062-4EDD-B0C3-8606D6178BEB}" type="datetimeFigureOut">
               <a:rPr lang="ko-KR" altLang="en-US" smtClean="0"/>
-              <a:t>2021-06-15</a:t>
+              <a:t>2021-06-17</a:t>
             </a:fld>
             <a:endParaRPr lang="ko-KR" altLang="en-US"/>
           </a:p>
@@ -765,7 +767,7 @@
           <a:p>
             <a:fld id="{CE992262-0062-4EDD-B0C3-8606D6178BEB}" type="datetimeFigureOut">
               <a:rPr lang="ko-KR" altLang="en-US" smtClean="0"/>
-              <a:t>2021-06-15</a:t>
+              <a:t>2021-06-17</a:t>
             </a:fld>
             <a:endParaRPr lang="ko-KR" altLang="en-US"/>
           </a:p>
@@ -1011,7 +1013,7 @@
           <a:p>
             <a:fld id="{CE992262-0062-4EDD-B0C3-8606D6178BEB}" type="datetimeFigureOut">
               <a:rPr lang="ko-KR" altLang="en-US" smtClean="0"/>
-              <a:t>2021-06-15</a:t>
+              <a:t>2021-06-17</a:t>
             </a:fld>
             <a:endParaRPr lang="ko-KR" altLang="en-US"/>
           </a:p>
@@ -1243,7 +1245,7 @@
           <a:p>
             <a:fld id="{CE992262-0062-4EDD-B0C3-8606D6178BEB}" type="datetimeFigureOut">
               <a:rPr lang="ko-KR" altLang="en-US" smtClean="0"/>
-              <a:t>2021-06-15</a:t>
+              <a:t>2021-06-17</a:t>
             </a:fld>
             <a:endParaRPr lang="ko-KR" altLang="en-US"/>
           </a:p>
@@ -1610,7 +1612,7 @@
           <a:p>
             <a:fld id="{CE992262-0062-4EDD-B0C3-8606D6178BEB}" type="datetimeFigureOut">
               <a:rPr lang="ko-KR" altLang="en-US" smtClean="0"/>
-              <a:t>2021-06-15</a:t>
+              <a:t>2021-06-17</a:t>
             </a:fld>
             <a:endParaRPr lang="ko-KR" altLang="en-US"/>
           </a:p>
@@ -1728,7 +1730,7 @@
           <a:p>
             <a:fld id="{CE992262-0062-4EDD-B0C3-8606D6178BEB}" type="datetimeFigureOut">
               <a:rPr lang="ko-KR" altLang="en-US" smtClean="0"/>
-              <a:t>2021-06-15</a:t>
+              <a:t>2021-06-17</a:t>
             </a:fld>
             <a:endParaRPr lang="ko-KR" altLang="en-US"/>
           </a:p>
@@ -1823,7 +1825,7 @@
           <a:p>
             <a:fld id="{CE992262-0062-4EDD-B0C3-8606D6178BEB}" type="datetimeFigureOut">
               <a:rPr lang="ko-KR" altLang="en-US" smtClean="0"/>
-              <a:t>2021-06-15</a:t>
+              <a:t>2021-06-17</a:t>
             </a:fld>
             <a:endParaRPr lang="ko-KR" altLang="en-US"/>
           </a:p>
@@ -2100,7 +2102,7 @@
           <a:p>
             <a:fld id="{CE992262-0062-4EDD-B0C3-8606D6178BEB}" type="datetimeFigureOut">
               <a:rPr lang="ko-KR" altLang="en-US" smtClean="0"/>
-              <a:t>2021-06-15</a:t>
+              <a:t>2021-06-17</a:t>
             </a:fld>
             <a:endParaRPr lang="ko-KR" altLang="en-US"/>
           </a:p>
@@ -2353,7 +2355,7 @@
           <a:p>
             <a:fld id="{CE992262-0062-4EDD-B0C3-8606D6178BEB}" type="datetimeFigureOut">
               <a:rPr lang="ko-KR" altLang="en-US" smtClean="0"/>
-              <a:t>2021-06-15</a:t>
+              <a:t>2021-06-17</a:t>
             </a:fld>
             <a:endParaRPr lang="ko-KR" altLang="en-US"/>
           </a:p>
@@ -2566,7 +2568,7 @@
           <a:p>
             <a:fld id="{CE992262-0062-4EDD-B0C3-8606D6178BEB}" type="datetimeFigureOut">
               <a:rPr lang="ko-KR" altLang="en-US" smtClean="0"/>
-              <a:t>2021-06-15</a:t>
+              <a:t>2021-06-17</a:t>
             </a:fld>
             <a:endParaRPr lang="ko-KR" altLang="en-US"/>
           </a:p>
@@ -3652,11 +3654,7 @@
               <a:pPr algn="ctr"/>
               <a:r>
                 <a:rPr lang="en-US" altLang="ko-KR" sz="1000" dirty="0" smtClean="0"/>
-                <a:t>[TLS] secure </a:t>
-              </a:r>
-              <a:r>
-                <a:rPr lang="en-US" altLang="ko-KR" sz="1000" dirty="0" smtClean="0"/>
-                <a:t>channel for control data</a:t>
+                <a:t>[TLS] secure channel for control data</a:t>
               </a:r>
               <a:endParaRPr lang="ko-KR" altLang="en-US" sz="1000" dirty="0"/>
             </a:p>
@@ -3860,7 +3858,6 @@
                 <a:rPr lang="en-US" altLang="ko-KR" sz="1000" b="1" dirty="0" smtClean="0"/>
                 <a:t>192.168.0.228:5000</a:t>
               </a:r>
-              <a:endParaRPr lang="en-US" altLang="ko-KR" sz="1000" b="1" dirty="0" smtClean="0"/>
             </a:p>
           </p:txBody>
         </p:sp>
@@ -5287,7 +5284,6 @@
               <a:rPr lang="en-US" altLang="ko-KR" sz="1100" dirty="0" smtClean="0"/>
               <a:t>photo, resume and pause again.</a:t>
             </a:r>
-            <a:endParaRPr lang="en-US" altLang="ko-KR" sz="1100" dirty="0" smtClean="0"/>
           </a:p>
           <a:p>
             <a:pPr marL="171450" indent="-171450">
@@ -5316,7 +5312,6 @@
               <a:rPr lang="en-US" altLang="ko-KR" sz="1100" dirty="0" smtClean="0"/>
               <a:t>: Request the saving of photo to the server</a:t>
             </a:r>
-            <a:endParaRPr lang="en-US" altLang="ko-KR" sz="1100" dirty="0" smtClean="0"/>
           </a:p>
         </p:txBody>
       </p:sp>
@@ -6884,6 +6879,336 @@
     <p:extLst>
       <p:ext uri="{BB962C8B-B14F-4D97-AF65-F5344CB8AC3E}">
         <p14:creationId xmlns:p14="http://schemas.microsoft.com/office/powerpoint/2010/main" val="4226745596"/>
+      </p:ext>
+    </p:extLst>
+  </p:cSld>
+  <p:clrMapOvr>
+    <a:masterClrMapping/>
+  </p:clrMapOvr>
+</p:sld>
+</file>
+
+<file path=ppt/slides/slide4.xml><?xml version="1.0" encoding="utf-8"?>
+<p:sld xmlns:a="http://schemas.openxmlformats.org/drawingml/2006/main" xmlns:r="http://schemas.openxmlformats.org/officeDocument/2006/relationships" xmlns:p="http://schemas.openxmlformats.org/presentationml/2006/main">
+  <p:cSld>
+    <p:spTree>
+      <p:nvGrpSpPr>
+        <p:cNvPr id="1" name=""/>
+        <p:cNvGrpSpPr/>
+        <p:nvPr/>
+      </p:nvGrpSpPr>
+      <p:grpSpPr>
+        <a:xfrm>
+          <a:off x="0" y="0"/>
+          <a:ext cx="0" cy="0"/>
+          <a:chOff x="0" y="0"/>
+          <a:chExt cx="0" cy="0"/>
+        </a:xfrm>
+      </p:grpSpPr>
+      <p:pic>
+        <p:nvPicPr>
+          <p:cNvPr id="15" name="그림 14"/>
+          <p:cNvPicPr>
+            <a:picLocks noChangeAspect="1"/>
+          </p:cNvPicPr>
+          <p:nvPr/>
+        </p:nvPicPr>
+        <p:blipFill>
+          <a:blip r:embed="rId2">
+            <a:extLst>
+              <a:ext uri="{28A0092B-C50C-407E-A947-70E740481C1C}">
+                <a14:useLocalDpi xmlns:a14="http://schemas.microsoft.com/office/drawing/2010/main" val="0"/>
+              </a:ext>
+            </a:extLst>
+          </a:blip>
+          <a:stretch>
+            <a:fillRect/>
+          </a:stretch>
+        </p:blipFill>
+        <p:spPr>
+          <a:xfrm>
+            <a:off x="164994" y="2910998"/>
+            <a:ext cx="4352400" cy="2619549"/>
+          </a:xfrm>
+          <a:prstGeom prst="rect">
+            <a:avLst/>
+          </a:prstGeom>
+        </p:spPr>
+      </p:pic>
+      <p:pic>
+        <p:nvPicPr>
+          <p:cNvPr id="4" name="그림 3"/>
+          <p:cNvPicPr>
+            <a:picLocks noChangeAspect="1"/>
+          </p:cNvPicPr>
+          <p:nvPr/>
+        </p:nvPicPr>
+        <p:blipFill>
+          <a:blip r:embed="rId3">
+            <a:extLst>
+              <a:ext uri="{28A0092B-C50C-407E-A947-70E740481C1C}">
+                <a14:useLocalDpi xmlns:a14="http://schemas.microsoft.com/office/drawing/2010/main" val="0"/>
+              </a:ext>
+            </a:extLst>
+          </a:blip>
+          <a:stretch>
+            <a:fillRect/>
+          </a:stretch>
+        </p:blipFill>
+        <p:spPr>
+          <a:xfrm>
+            <a:off x="164994" y="132110"/>
+            <a:ext cx="4352400" cy="2625577"/>
+          </a:xfrm>
+          <a:prstGeom prst="rect">
+            <a:avLst/>
+          </a:prstGeom>
+        </p:spPr>
+      </p:pic>
+      <p:pic>
+        <p:nvPicPr>
+          <p:cNvPr id="5" name="그림 4"/>
+          <p:cNvPicPr>
+            <a:picLocks noChangeAspect="1"/>
+          </p:cNvPicPr>
+          <p:nvPr/>
+        </p:nvPicPr>
+        <p:blipFill>
+          <a:blip r:embed="rId4">
+            <a:extLst>
+              <a:ext uri="{28A0092B-C50C-407E-A947-70E740481C1C}">
+                <a14:useLocalDpi xmlns:a14="http://schemas.microsoft.com/office/drawing/2010/main" val="0"/>
+              </a:ext>
+            </a:extLst>
+          </a:blip>
+          <a:stretch>
+            <a:fillRect/>
+          </a:stretch>
+        </p:blipFill>
+        <p:spPr>
+          <a:xfrm>
+            <a:off x="6891081" y="132110"/>
+            <a:ext cx="4352400" cy="2625577"/>
+          </a:xfrm>
+          <a:prstGeom prst="rect">
+            <a:avLst/>
+          </a:prstGeom>
+        </p:spPr>
+      </p:pic>
+      <p:pic>
+        <p:nvPicPr>
+          <p:cNvPr id="7" name="그림 6"/>
+          <p:cNvPicPr>
+            <a:picLocks noChangeAspect="1"/>
+          </p:cNvPicPr>
+          <p:nvPr/>
+        </p:nvPicPr>
+        <p:blipFill>
+          <a:blip r:embed="rId5">
+            <a:extLst>
+              <a:ext uri="{28A0092B-C50C-407E-A947-70E740481C1C}">
+                <a14:useLocalDpi xmlns:a14="http://schemas.microsoft.com/office/drawing/2010/main" val="0"/>
+              </a:ext>
+            </a:extLst>
+          </a:blip>
+          <a:stretch>
+            <a:fillRect/>
+          </a:stretch>
+        </p:blipFill>
+        <p:spPr>
+          <a:xfrm>
+            <a:off x="1564902" y="4220772"/>
+            <a:ext cx="4352400" cy="2619549"/>
+          </a:xfrm>
+          <a:prstGeom prst="rect">
+            <a:avLst/>
+          </a:prstGeom>
+        </p:spPr>
+      </p:pic>
+      <p:pic>
+        <p:nvPicPr>
+          <p:cNvPr id="14" name="그림 13"/>
+          <p:cNvPicPr>
+            <a:picLocks noChangeAspect="1"/>
+          </p:cNvPicPr>
+          <p:nvPr/>
+        </p:nvPicPr>
+        <p:blipFill>
+          <a:blip r:embed="rId6">
+            <a:extLst>
+              <a:ext uri="{28A0092B-C50C-407E-A947-70E740481C1C}">
+                <a14:useLocalDpi xmlns:a14="http://schemas.microsoft.com/office/drawing/2010/main" val="0"/>
+              </a:ext>
+            </a:extLst>
+          </a:blip>
+          <a:stretch>
+            <a:fillRect/>
+          </a:stretch>
+        </p:blipFill>
+        <p:spPr>
+          <a:xfrm>
+            <a:off x="6891081" y="3132761"/>
+            <a:ext cx="4352400" cy="2619549"/>
+          </a:xfrm>
+          <a:prstGeom prst="rect">
+            <a:avLst/>
+          </a:prstGeom>
+        </p:spPr>
+      </p:pic>
+    </p:spTree>
+    <p:extLst>
+      <p:ext uri="{BB962C8B-B14F-4D97-AF65-F5344CB8AC3E}">
+        <p14:creationId xmlns:p14="http://schemas.microsoft.com/office/powerpoint/2010/main" val="771528724"/>
+      </p:ext>
+    </p:extLst>
+  </p:cSld>
+  <p:clrMapOvr>
+    <a:masterClrMapping/>
+  </p:clrMapOvr>
+</p:sld>
+</file>
+
+<file path=ppt/slides/slide5.xml><?xml version="1.0" encoding="utf-8"?>
+<p:sld xmlns:a="http://schemas.openxmlformats.org/drawingml/2006/main" xmlns:r="http://schemas.openxmlformats.org/officeDocument/2006/relationships" xmlns:p="http://schemas.openxmlformats.org/presentationml/2006/main">
+  <p:cSld>
+    <p:spTree>
+      <p:nvGrpSpPr>
+        <p:cNvPr id="1" name=""/>
+        <p:cNvGrpSpPr/>
+        <p:nvPr/>
+      </p:nvGrpSpPr>
+      <p:grpSpPr>
+        <a:xfrm>
+          <a:off x="0" y="0"/>
+          <a:ext cx="0" cy="0"/>
+          <a:chOff x="0" y="0"/>
+          <a:chExt cx="0" cy="0"/>
+        </a:xfrm>
+      </p:grpSpPr>
+      <p:pic>
+        <p:nvPicPr>
+          <p:cNvPr id="6" name="그림 5"/>
+          <p:cNvPicPr>
+            <a:picLocks noChangeAspect="1"/>
+          </p:cNvPicPr>
+          <p:nvPr/>
+        </p:nvPicPr>
+        <p:blipFill>
+          <a:blip r:embed="rId2">
+            <a:extLst>
+              <a:ext uri="{28A0092B-C50C-407E-A947-70E740481C1C}">
+                <a14:useLocalDpi xmlns:a14="http://schemas.microsoft.com/office/drawing/2010/main" val="0"/>
+              </a:ext>
+            </a:extLst>
+          </a:blip>
+          <a:stretch>
+            <a:fillRect/>
+          </a:stretch>
+        </p:blipFill>
+        <p:spPr>
+          <a:xfrm>
+            <a:off x="521772" y="3532191"/>
+            <a:ext cx="4352400" cy="2619549"/>
+          </a:xfrm>
+          <a:prstGeom prst="rect">
+            <a:avLst/>
+          </a:prstGeom>
+        </p:spPr>
+      </p:pic>
+      <p:pic>
+        <p:nvPicPr>
+          <p:cNvPr id="7" name="그림 6"/>
+          <p:cNvPicPr>
+            <a:picLocks noChangeAspect="1"/>
+          </p:cNvPicPr>
+          <p:nvPr/>
+        </p:nvPicPr>
+        <p:blipFill>
+          <a:blip r:embed="rId3">
+            <a:extLst>
+              <a:ext uri="{28A0092B-C50C-407E-A947-70E740481C1C}">
+                <a14:useLocalDpi xmlns:a14="http://schemas.microsoft.com/office/drawing/2010/main" val="0"/>
+              </a:ext>
+            </a:extLst>
+          </a:blip>
+          <a:stretch>
+            <a:fillRect/>
+          </a:stretch>
+        </p:blipFill>
+        <p:spPr>
+          <a:xfrm>
+            <a:off x="5317554" y="167621"/>
+            <a:ext cx="4352400" cy="2619549"/>
+          </a:xfrm>
+          <a:prstGeom prst="rect">
+            <a:avLst/>
+          </a:prstGeom>
+        </p:spPr>
+      </p:pic>
+      <p:pic>
+        <p:nvPicPr>
+          <p:cNvPr id="8" name="그림 7"/>
+          <p:cNvPicPr>
+            <a:picLocks noChangeAspect="1"/>
+          </p:cNvPicPr>
+          <p:nvPr/>
+        </p:nvPicPr>
+        <p:blipFill>
+          <a:blip r:embed="rId4">
+            <a:extLst>
+              <a:ext uri="{28A0092B-C50C-407E-A947-70E740481C1C}">
+                <a14:useLocalDpi xmlns:a14="http://schemas.microsoft.com/office/drawing/2010/main" val="0"/>
+              </a:ext>
+            </a:extLst>
+          </a:blip>
+          <a:stretch>
+            <a:fillRect/>
+          </a:stretch>
+        </p:blipFill>
+        <p:spPr>
+          <a:xfrm>
+            <a:off x="5317554" y="3532191"/>
+            <a:ext cx="4352400" cy="2619549"/>
+          </a:xfrm>
+          <a:prstGeom prst="rect">
+            <a:avLst/>
+          </a:prstGeom>
+        </p:spPr>
+      </p:pic>
+      <p:pic>
+        <p:nvPicPr>
+          <p:cNvPr id="9" name="그림 8"/>
+          <p:cNvPicPr>
+            <a:picLocks noChangeAspect="1"/>
+          </p:cNvPicPr>
+          <p:nvPr/>
+        </p:nvPicPr>
+        <p:blipFill>
+          <a:blip r:embed="rId5">
+            <a:extLst>
+              <a:ext uri="{28A0092B-C50C-407E-A947-70E740481C1C}">
+                <a14:useLocalDpi xmlns:a14="http://schemas.microsoft.com/office/drawing/2010/main" val="0"/>
+              </a:ext>
+            </a:extLst>
+          </a:blip>
+          <a:stretch>
+            <a:fillRect/>
+          </a:stretch>
+        </p:blipFill>
+        <p:spPr>
+          <a:xfrm>
+            <a:off x="497310" y="167621"/>
+            <a:ext cx="4352400" cy="2619549"/>
+          </a:xfrm>
+          <a:prstGeom prst="rect">
+            <a:avLst/>
+          </a:prstGeom>
+        </p:spPr>
+      </p:pic>
+    </p:spTree>
+    <p:extLst>
+      <p:ext uri="{BB962C8B-B14F-4D97-AF65-F5344CB8AC3E}">
+        <p14:creationId xmlns:p14="http://schemas.microsoft.com/office/powerpoint/2010/main" val="1409392731"/>
       </p:ext>
     </p:extLst>
   </p:cSld>

</xml_diff>